<commit_message>
commit before leaving SeAMK
</commit_message>
<xml_diff>
--- a/GridSearchCV_results/HF_case_fullpaper/Paper figures for Future Generation.pptx
+++ b/GridSearchCV_results/HF_case_fullpaper/Paper figures for Future Generation.pptx
@@ -6,14 +6,15 @@
   </p:sldMasterIdLst>
   <p:sldIdLst>
     <p:sldId id="256" r:id="rId2"/>
-    <p:sldId id="257" r:id="rId3"/>
-    <p:sldId id="258" r:id="rId4"/>
-    <p:sldId id="259" r:id="rId5"/>
-    <p:sldId id="260" r:id="rId6"/>
-    <p:sldId id="261" r:id="rId7"/>
-    <p:sldId id="262" r:id="rId8"/>
-    <p:sldId id="263" r:id="rId9"/>
-    <p:sldId id="264" r:id="rId10"/>
+    <p:sldId id="265" r:id="rId3"/>
+    <p:sldId id="257" r:id="rId4"/>
+    <p:sldId id="258" r:id="rId5"/>
+    <p:sldId id="259" r:id="rId6"/>
+    <p:sldId id="260" r:id="rId7"/>
+    <p:sldId id="261" r:id="rId8"/>
+    <p:sldId id="262" r:id="rId9"/>
+    <p:sldId id="263" r:id="rId10"/>
+    <p:sldId id="264" r:id="rId11"/>
   </p:sldIdLst>
   <p:sldSz cx="12192000" cy="6858000"/>
   <p:notesSz cx="6858000" cy="9144000"/>
@@ -123,7 +124,7 @@
 <file path=ppt/revisionInfo.xml><?xml version="1.0" encoding="utf-8"?>
 <p1510:revInfo xmlns:a="http://schemas.openxmlformats.org/drawingml/2006/main" xmlns:r="http://schemas.openxmlformats.org/officeDocument/2006/relationships" xmlns:p1510="http://schemas.microsoft.com/office/powerpoint/2015/10/main">
   <p1510:revLst>
-    <p1510:client id="{3B4A9615-F710-44C3-96DA-32D4F5BF13DB}" v="10" dt="2021-07-01T06:58:57.274"/>
+    <p1510:client id="{3B4A9615-F710-44C3-96DA-32D4F5BF13DB}" v="12" dt="2021-07-01T20:42:29.857"/>
   </p1510:revLst>
 </p1510:revInfo>
 </file>
@@ -132,13 +133,13 @@
 <pc:chgInfo xmlns:a="http://schemas.openxmlformats.org/drawingml/2006/main" xmlns:r="http://schemas.openxmlformats.org/officeDocument/2006/relationships" xmlns:ac="http://schemas.microsoft.com/office/drawing/2013/main/command" xmlns:pc="http://schemas.microsoft.com/office/powerpoint/2013/main/command">
   <pc:docChgLst>
     <pc:chgData name="Moreno Sánchez, Pedro" userId="71cd4dfd-eb1b-4fb1-943d-c24e993bfdc6" providerId="ADAL" clId="{3B4A9615-F710-44C3-96DA-32D4F5BF13DB}"/>
-    <pc:docChg chg="undo custSel modSld">
-      <pc:chgData name="Moreno Sánchez, Pedro" userId="71cd4dfd-eb1b-4fb1-943d-c24e993bfdc6" providerId="ADAL" clId="{3B4A9615-F710-44C3-96DA-32D4F5BF13DB}" dt="2021-07-01T06:59:04.826" v="38" actId="1076"/>
+    <pc:docChg chg="undo custSel addSld modSld">
+      <pc:chgData name="Moreno Sánchez, Pedro" userId="71cd4dfd-eb1b-4fb1-943d-c24e993bfdc6" providerId="ADAL" clId="{3B4A9615-F710-44C3-96DA-32D4F5BF13DB}" dt="2021-07-01T20:42:29.857" v="43"/>
       <pc:docMkLst>
         <pc:docMk/>
       </pc:docMkLst>
       <pc:sldChg chg="addSp modSp mod">
-        <pc:chgData name="Moreno Sánchez, Pedro" userId="71cd4dfd-eb1b-4fb1-943d-c24e993bfdc6" providerId="ADAL" clId="{3B4A9615-F710-44C3-96DA-32D4F5BF13DB}" dt="2021-06-30T11:02:31.817" v="28" actId="1076"/>
+        <pc:chgData name="Moreno Sánchez, Pedro" userId="71cd4dfd-eb1b-4fb1-943d-c24e993bfdc6" providerId="ADAL" clId="{3B4A9615-F710-44C3-96DA-32D4F5BF13DB}" dt="2021-07-01T20:41:05.102" v="39" actId="164"/>
         <pc:sldMkLst>
           <pc:docMk/>
           <pc:sldMk cId="2475213934" sldId="257"/>
@@ -192,7 +193,15 @@
           </ac:grpSpMkLst>
         </pc:grpChg>
         <pc:grpChg chg="add mod">
-          <ac:chgData name="Moreno Sánchez, Pedro" userId="71cd4dfd-eb1b-4fb1-943d-c24e993bfdc6" providerId="ADAL" clId="{3B4A9615-F710-44C3-96DA-32D4F5BF13DB}" dt="2021-06-30T11:02:12.627" v="26" actId="1037"/>
+          <ac:chgData name="Moreno Sánchez, Pedro" userId="71cd4dfd-eb1b-4fb1-943d-c24e993bfdc6" providerId="ADAL" clId="{3B4A9615-F710-44C3-96DA-32D4F5BF13DB}" dt="2021-07-01T20:41:05.102" v="39" actId="164"/>
+          <ac:grpSpMkLst>
+            <pc:docMk/>
+            <pc:sldMk cId="2475213934" sldId="257"/>
+            <ac:grpSpMk id="4" creationId="{60D519C3-C41E-4E23-9C6E-39D85EC076FB}"/>
+          </ac:grpSpMkLst>
+        </pc:grpChg>
+        <pc:grpChg chg="add mod">
+          <ac:chgData name="Moreno Sánchez, Pedro" userId="71cd4dfd-eb1b-4fb1-943d-c24e993bfdc6" providerId="ADAL" clId="{3B4A9615-F710-44C3-96DA-32D4F5BF13DB}" dt="2021-07-01T20:41:05.102" v="39" actId="164"/>
           <ac:grpSpMkLst>
             <pc:docMk/>
             <pc:sldMk cId="2475213934" sldId="257"/>
@@ -200,7 +209,7 @@
           </ac:grpSpMkLst>
         </pc:grpChg>
         <pc:grpChg chg="add mod">
-          <ac:chgData name="Moreno Sánchez, Pedro" userId="71cd4dfd-eb1b-4fb1-943d-c24e993bfdc6" providerId="ADAL" clId="{3B4A9615-F710-44C3-96DA-32D4F5BF13DB}" dt="2021-06-30T11:02:02.946" v="22" actId="1076"/>
+          <ac:chgData name="Moreno Sánchez, Pedro" userId="71cd4dfd-eb1b-4fb1-943d-c24e993bfdc6" providerId="ADAL" clId="{3B4A9615-F710-44C3-96DA-32D4F5BF13DB}" dt="2021-07-01T20:41:05.102" v="39" actId="164"/>
           <ac:grpSpMkLst>
             <pc:docMk/>
             <pc:sldMk cId="2475213934" sldId="257"/>
@@ -247,6 +256,37 @@
           </ac:picMkLst>
         </pc:picChg>
       </pc:sldChg>
+      <pc:sldChg chg="addSp delSp modSp new mod">
+        <pc:chgData name="Moreno Sánchez, Pedro" userId="71cd4dfd-eb1b-4fb1-943d-c24e993bfdc6" providerId="ADAL" clId="{3B4A9615-F710-44C3-96DA-32D4F5BF13DB}" dt="2021-07-01T20:42:29.857" v="43"/>
+        <pc:sldMkLst>
+          <pc:docMk/>
+          <pc:sldMk cId="2748871370" sldId="265"/>
+        </pc:sldMkLst>
+        <pc:spChg chg="del">
+          <ac:chgData name="Moreno Sánchez, Pedro" userId="71cd4dfd-eb1b-4fb1-943d-c24e993bfdc6" providerId="ADAL" clId="{3B4A9615-F710-44C3-96DA-32D4F5BF13DB}" dt="2021-07-01T20:42:28.228" v="42" actId="478"/>
+          <ac:spMkLst>
+            <pc:docMk/>
+            <pc:sldMk cId="2748871370" sldId="265"/>
+            <ac:spMk id="2" creationId="{7C0702A6-6654-4B27-840B-039D068D91EC}"/>
+          </ac:spMkLst>
+        </pc:spChg>
+        <pc:spChg chg="del">
+          <ac:chgData name="Moreno Sánchez, Pedro" userId="71cd4dfd-eb1b-4fb1-943d-c24e993bfdc6" providerId="ADAL" clId="{3B4A9615-F710-44C3-96DA-32D4F5BF13DB}" dt="2021-07-01T20:42:26.244" v="41" actId="478"/>
+          <ac:spMkLst>
+            <pc:docMk/>
+            <pc:sldMk cId="2748871370" sldId="265"/>
+            <ac:spMk id="3" creationId="{672B5D5B-3258-4877-B74D-1CDA1FFCB84D}"/>
+          </ac:spMkLst>
+        </pc:spChg>
+        <pc:picChg chg="add mod">
+          <ac:chgData name="Moreno Sánchez, Pedro" userId="71cd4dfd-eb1b-4fb1-943d-c24e993bfdc6" providerId="ADAL" clId="{3B4A9615-F710-44C3-96DA-32D4F5BF13DB}" dt="2021-07-01T20:42:29.857" v="43"/>
+          <ac:picMkLst>
+            <pc:docMk/>
+            <pc:sldMk cId="2748871370" sldId="265"/>
+            <ac:picMk id="4" creationId="{26EF5ADF-6969-4FAA-8427-C9694B415BDA}"/>
+          </ac:picMkLst>
+        </pc:picChg>
+      </pc:sldChg>
     </pc:docChg>
   </pc:docChgLst>
 </pc:chgInfo>
@@ -401,7 +441,7 @@
           <a:p>
             <a:fld id="{578B238B-6F13-47C9-86CB-94E3B9FE3459}" type="datetimeFigureOut">
               <a:rPr lang="en-GB" smtClean="0"/>
-              <a:t>27/06/2021</a:t>
+              <a:t>01/07/2021</a:t>
             </a:fld>
             <a:endParaRPr lang="en-GB"/>
           </a:p>
@@ -601,7 +641,7 @@
           <a:p>
             <a:fld id="{578B238B-6F13-47C9-86CB-94E3B9FE3459}" type="datetimeFigureOut">
               <a:rPr lang="en-GB" smtClean="0"/>
-              <a:t>27/06/2021</a:t>
+              <a:t>01/07/2021</a:t>
             </a:fld>
             <a:endParaRPr lang="en-GB"/>
           </a:p>
@@ -811,7 +851,7 @@
           <a:p>
             <a:fld id="{578B238B-6F13-47C9-86CB-94E3B9FE3459}" type="datetimeFigureOut">
               <a:rPr lang="en-GB" smtClean="0"/>
-              <a:t>27/06/2021</a:t>
+              <a:t>01/07/2021</a:t>
             </a:fld>
             <a:endParaRPr lang="en-GB"/>
           </a:p>
@@ -1011,7 +1051,7 @@
           <a:p>
             <a:fld id="{578B238B-6F13-47C9-86CB-94E3B9FE3459}" type="datetimeFigureOut">
               <a:rPr lang="en-GB" smtClean="0"/>
-              <a:t>27/06/2021</a:t>
+              <a:t>01/07/2021</a:t>
             </a:fld>
             <a:endParaRPr lang="en-GB"/>
           </a:p>
@@ -1287,7 +1327,7 @@
           <a:p>
             <a:fld id="{578B238B-6F13-47C9-86CB-94E3B9FE3459}" type="datetimeFigureOut">
               <a:rPr lang="en-GB" smtClean="0"/>
-              <a:t>27/06/2021</a:t>
+              <a:t>01/07/2021</a:t>
             </a:fld>
             <a:endParaRPr lang="en-GB"/>
           </a:p>
@@ -1555,7 +1595,7 @@
           <a:p>
             <a:fld id="{578B238B-6F13-47C9-86CB-94E3B9FE3459}" type="datetimeFigureOut">
               <a:rPr lang="en-GB" smtClean="0"/>
-              <a:t>27/06/2021</a:t>
+              <a:t>01/07/2021</a:t>
             </a:fld>
             <a:endParaRPr lang="en-GB"/>
           </a:p>
@@ -1970,7 +2010,7 @@
           <a:p>
             <a:fld id="{578B238B-6F13-47C9-86CB-94E3B9FE3459}" type="datetimeFigureOut">
               <a:rPr lang="en-GB" smtClean="0"/>
-              <a:t>27/06/2021</a:t>
+              <a:t>01/07/2021</a:t>
             </a:fld>
             <a:endParaRPr lang="en-GB"/>
           </a:p>
@@ -2112,7 +2152,7 @@
           <a:p>
             <a:fld id="{578B238B-6F13-47C9-86CB-94E3B9FE3459}" type="datetimeFigureOut">
               <a:rPr lang="en-GB" smtClean="0"/>
-              <a:t>27/06/2021</a:t>
+              <a:t>01/07/2021</a:t>
             </a:fld>
             <a:endParaRPr lang="en-GB"/>
           </a:p>
@@ -2225,7 +2265,7 @@
           <a:p>
             <a:fld id="{578B238B-6F13-47C9-86CB-94E3B9FE3459}" type="datetimeFigureOut">
               <a:rPr lang="en-GB" smtClean="0"/>
-              <a:t>27/06/2021</a:t>
+              <a:t>01/07/2021</a:t>
             </a:fld>
             <a:endParaRPr lang="en-GB"/>
           </a:p>
@@ -2538,7 +2578,7 @@
           <a:p>
             <a:fld id="{578B238B-6F13-47C9-86CB-94E3B9FE3459}" type="datetimeFigureOut">
               <a:rPr lang="en-GB" smtClean="0"/>
-              <a:t>27/06/2021</a:t>
+              <a:t>01/07/2021</a:t>
             </a:fld>
             <a:endParaRPr lang="en-GB"/>
           </a:p>
@@ -2827,7 +2867,7 @@
           <a:p>
             <a:fld id="{578B238B-6F13-47C9-86CB-94E3B9FE3459}" type="datetimeFigureOut">
               <a:rPr lang="en-GB" smtClean="0"/>
-              <a:t>27/06/2021</a:t>
+              <a:t>01/07/2021</a:t>
             </a:fld>
             <a:endParaRPr lang="en-GB"/>
           </a:p>
@@ -3070,7 +3110,7 @@
           <a:p>
             <a:fld id="{578B238B-6F13-47C9-86CB-94E3B9FE3459}" type="datetimeFigureOut">
               <a:rPr lang="en-GB" smtClean="0"/>
-              <a:t>27/06/2021</a:t>
+              <a:t>01/07/2021</a:t>
             </a:fld>
             <a:endParaRPr lang="en-GB"/>
           </a:p>
@@ -3574,6 +3614,219 @@
 </p:sld>
 </file>
 
+<file path=ppt/slides/slide10.xml><?xml version="1.0" encoding="utf-8"?>
+<p:sld xmlns:a="http://schemas.openxmlformats.org/drawingml/2006/main" xmlns:r="http://schemas.openxmlformats.org/officeDocument/2006/relationships" xmlns:p="http://schemas.openxmlformats.org/presentationml/2006/main">
+  <p:cSld>
+    <p:bg>
+      <p:bgPr>
+        <a:solidFill>
+          <a:schemeClr val="bg1"/>
+        </a:solidFill>
+        <a:effectLst/>
+      </p:bgPr>
+    </p:bg>
+    <p:spTree>
+      <p:nvGrpSpPr>
+        <p:cNvPr id="1" name=""/>
+        <p:cNvGrpSpPr/>
+        <p:nvPr/>
+      </p:nvGrpSpPr>
+      <p:grpSpPr>
+        <a:xfrm>
+          <a:off x="0" y="0"/>
+          <a:ext cx="0" cy="0"/>
+          <a:chOff x="0" y="0"/>
+          <a:chExt cx="0" cy="0"/>
+        </a:xfrm>
+      </p:grpSpPr>
+      <p:sp useBgFill="1">
+        <p:nvSpPr>
+          <p:cNvPr id="12" name="Rectangle 11">
+            <a:extLst>
+              <a:ext uri="{FF2B5EF4-FFF2-40B4-BE49-F238E27FC236}">
+                <a16:creationId xmlns:a16="http://schemas.microsoft.com/office/drawing/2014/main" id="{022BDE4A-8A20-4A69-9C5A-581C82036A4D}"/>
+              </a:ext>
+              <a:ext uri="{C183D7F6-B498-43B3-948B-1728B52AA6E4}">
+                <adec:decorative xmlns:adec="http://schemas.microsoft.com/office/drawing/2017/decorative" val="1"/>
+              </a:ext>
+            </a:extLst>
+          </p:cNvPr>
+          <p:cNvSpPr>
+            <a:spLocks noGrp="1" noRot="1" noChangeAspect="1" noMove="1" noResize="1" noEditPoints="1" noAdjustHandles="1" noChangeArrowheads="1" noChangeShapeType="1" noTextEdit="1"/>
+          </p:cNvSpPr>
+          <p:nvPr>
+            <p:extLst>
+              <p:ext uri="{386F3935-93C4-4BCD-93E2-E3B085C9AB24}">
+                <p16:designElem xmlns:p16="http://schemas.microsoft.com/office/powerpoint/2015/main" val="1"/>
+              </p:ext>
+            </p:extLst>
+          </p:nvPr>
+        </p:nvSpPr>
+        <p:spPr>
+          <a:xfrm>
+            <a:off x="-1" y="0"/>
+            <a:ext cx="12188952" cy="6858000"/>
+          </a:xfrm>
+          <a:prstGeom prst="rect">
+            <a:avLst/>
+          </a:prstGeom>
+          <a:ln>
+            <a:noFill/>
+          </a:ln>
+        </p:spPr>
+        <p:style>
+          <a:lnRef idx="2">
+            <a:schemeClr val="accent1">
+              <a:shade val="50000"/>
+            </a:schemeClr>
+          </a:lnRef>
+          <a:fillRef idx="1">
+            <a:schemeClr val="accent1"/>
+          </a:fillRef>
+          <a:effectRef idx="0">
+            <a:schemeClr val="accent1"/>
+          </a:effectRef>
+          <a:fontRef idx="minor">
+            <a:schemeClr val="lt1"/>
+          </a:fontRef>
+        </p:style>
+        <p:txBody>
+          <a:bodyPr rtlCol="0" anchor="ctr"/>
+          <a:lstStyle/>
+          <a:p>
+            <a:pPr algn="ctr"/>
+            <a:endParaRPr lang="en-US"/>
+          </a:p>
+        </p:txBody>
+      </p:sp>
+      <p:sp>
+        <p:nvSpPr>
+          <p:cNvPr id="2" name="Title 1">
+            <a:extLst>
+              <a:ext uri="{FF2B5EF4-FFF2-40B4-BE49-F238E27FC236}">
+                <a16:creationId xmlns:a16="http://schemas.microsoft.com/office/drawing/2014/main" id="{2393D49A-9C3F-4232-B40B-B90C71A0B4F0}"/>
+              </a:ext>
+            </a:extLst>
+          </p:cNvPr>
+          <p:cNvSpPr>
+            <a:spLocks noGrp="1"/>
+          </p:cNvSpPr>
+          <p:nvPr>
+            <p:ph type="title"/>
+          </p:nvPr>
+        </p:nvSpPr>
+        <p:spPr>
+          <a:xfrm>
+            <a:off x="1001684" y="170412"/>
+            <a:ext cx="10178934" cy="1328730"/>
+          </a:xfrm>
+        </p:spPr>
+        <p:txBody>
+          <a:bodyPr vert="horz" lIns="91440" tIns="45720" rIns="91440" bIns="45720" rtlCol="0" anchor="b">
+            <a:normAutofit/>
+          </a:bodyPr>
+          <a:lstStyle/>
+          <a:p>
+            <a:pPr algn="ctr"/>
+            <a:r>
+              <a:rPr lang="en-US" sz="5200" kern="1200" dirty="0">
+                <a:solidFill>
+                  <a:schemeClr val="tx1"/>
+                </a:solidFill>
+                <a:latin typeface="+mj-lt"/>
+                <a:ea typeface="+mj-ea"/>
+                <a:cs typeface="+mj-cs"/>
+              </a:rPr>
+              <a:t>PDP 2D (Ejection-serum)</a:t>
+            </a:r>
+          </a:p>
+        </p:txBody>
+      </p:sp>
+      <p:pic>
+        <p:nvPicPr>
+          <p:cNvPr id="5" name="Content Placeholder 4">
+            <a:extLst>
+              <a:ext uri="{FF2B5EF4-FFF2-40B4-BE49-F238E27FC236}">
+                <a16:creationId xmlns:a16="http://schemas.microsoft.com/office/drawing/2014/main" id="{7DF49395-6E99-4266-B8F5-2E09778B4D47}"/>
+              </a:ext>
+            </a:extLst>
+          </p:cNvPr>
+          <p:cNvPicPr>
+            <a:picLocks noGrp="1" noChangeAspect="1"/>
+          </p:cNvPicPr>
+          <p:nvPr>
+            <p:ph idx="1"/>
+          </p:nvPr>
+        </p:nvPicPr>
+        <p:blipFill>
+          <a:blip r:embed="rId2">
+            <a:extLst>
+              <a:ext uri="{28A0092B-C50C-407E-A947-70E740481C1C}">
+                <a14:useLocalDpi xmlns:a14="http://schemas.microsoft.com/office/drawing/2010/main" val="0"/>
+              </a:ext>
+            </a:extLst>
+          </a:blip>
+          <a:srcRect/>
+          <a:stretch/>
+        </p:blipFill>
+        <p:spPr>
+          <a:xfrm>
+            <a:off x="292677" y="2590429"/>
+            <a:ext cx="5803322" cy="3530394"/>
+          </a:xfrm>
+          <a:prstGeom prst="rect">
+            <a:avLst/>
+          </a:prstGeom>
+        </p:spPr>
+      </p:pic>
+      <p:pic>
+        <p:nvPicPr>
+          <p:cNvPr id="7" name="Picture 6">
+            <a:extLst>
+              <a:ext uri="{FF2B5EF4-FFF2-40B4-BE49-F238E27FC236}">
+                <a16:creationId xmlns:a16="http://schemas.microsoft.com/office/drawing/2014/main" id="{C79BE151-4064-4191-855E-58EA46DF7964}"/>
+              </a:ext>
+            </a:extLst>
+          </p:cNvPr>
+          <p:cNvPicPr>
+            <a:picLocks noChangeAspect="1"/>
+          </p:cNvPicPr>
+          <p:nvPr/>
+        </p:nvPicPr>
+        <p:blipFill>
+          <a:blip r:embed="rId3">
+            <a:extLst>
+              <a:ext uri="{28A0092B-C50C-407E-A947-70E740481C1C}">
+                <a14:useLocalDpi xmlns:a14="http://schemas.microsoft.com/office/drawing/2010/main" val="0"/>
+              </a:ext>
+            </a:extLst>
+          </a:blip>
+          <a:srcRect/>
+          <a:stretch/>
+        </p:blipFill>
+        <p:spPr>
+          <a:xfrm>
+            <a:off x="7251562" y="2410448"/>
+            <a:ext cx="3680067" cy="3890356"/>
+          </a:xfrm>
+          <a:prstGeom prst="rect">
+            <a:avLst/>
+          </a:prstGeom>
+        </p:spPr>
+      </p:pic>
+    </p:spTree>
+    <p:extLst>
+      <p:ext uri="{BB962C8B-B14F-4D97-AF65-F5344CB8AC3E}">
+        <p14:creationId xmlns:p14="http://schemas.microsoft.com/office/powerpoint/2010/main" val="288849488"/>
+      </p:ext>
+    </p:extLst>
+  </p:cSld>
+  <p:clrMapOvr>
+    <a:masterClrMapping/>
+  </p:clrMapOvr>
+</p:sld>
+</file>
+
 <file path=ppt/slides/slide2.xml><?xml version="1.0" encoding="utf-8"?>
 <p:sld xmlns:a="http://schemas.openxmlformats.org/drawingml/2006/main" xmlns:r="http://schemas.openxmlformats.org/officeDocument/2006/relationships" xmlns:p="http://schemas.openxmlformats.org/presentationml/2006/main">
   <p:cSld>
@@ -3591,55 +3844,16 @@
           <a:chExt cx="0" cy="0"/>
         </a:xfrm>
       </p:grpSpPr>
-      <p:sp>
-        <p:nvSpPr>
-          <p:cNvPr id="2" name="Title 1">
-            <a:extLst>
-              <a:ext uri="{FF2B5EF4-FFF2-40B4-BE49-F238E27FC236}">
-                <a16:creationId xmlns:a16="http://schemas.microsoft.com/office/drawing/2014/main" id="{9ECB5ABF-A678-4857-96BA-42960580D530}"/>
-              </a:ext>
-            </a:extLst>
-          </p:cNvPr>
-          <p:cNvSpPr>
-            <a:spLocks noGrp="1"/>
-          </p:cNvSpPr>
-          <p:nvPr>
-            <p:ph type="title"/>
-          </p:nvPr>
-        </p:nvSpPr>
-        <p:spPr/>
-        <p:txBody>
-          <a:bodyPr/>
-          <a:lstStyle/>
-          <a:p>
-            <a:r>
-              <a:rPr lang="fi-FI" dirty="0" err="1"/>
-              <a:t>Implicit</a:t>
-            </a:r>
-            <a:r>
-              <a:rPr lang="fi-FI" dirty="0"/>
-              <a:t> Feature </a:t>
-            </a:r>
-            <a:r>
-              <a:rPr lang="fi-FI" dirty="0" err="1"/>
-              <a:t>Importance</a:t>
-            </a:r>
-            <a:endParaRPr lang="en-GB" dirty="0"/>
-          </a:p>
-        </p:txBody>
-      </p:sp>
       <p:pic>
         <p:nvPicPr>
-          <p:cNvPr id="8" name="Picture 7" descr="Chart, bar chart, funnel chart&#10;&#10;Description automatically generated">
-            <a:extLst>
-              <a:ext uri="{FF2B5EF4-FFF2-40B4-BE49-F238E27FC236}">
-                <a16:creationId xmlns:a16="http://schemas.microsoft.com/office/drawing/2014/main" id="{9B78ED4A-3E91-4051-8549-88A275D51710}"/>
-              </a:ext>
-            </a:extLst>
-          </p:cNvPr>
-          <p:cNvPicPr>
-            <a:picLocks noChangeAspect="1"/>
-          </p:cNvPicPr>
+          <p:cNvPr id="4" name="Picture 3">
+            <a:extLst>
+              <a:ext uri="{FF2B5EF4-FFF2-40B4-BE49-F238E27FC236}">
+                <a16:creationId xmlns:a16="http://schemas.microsoft.com/office/drawing/2014/main" id="{26EF5ADF-6969-4FAA-8427-C9694B415BDA}"/>
+              </a:ext>
+            </a:extLst>
+          </p:cNvPr>
+          <p:cNvPicPr/>
           <p:nvPr/>
         </p:nvPicPr>
         <p:blipFill>
@@ -3650,380 +3864,29 @@
               </a:ext>
             </a:extLst>
           </a:blip>
+          <a:srcRect/>
           <a:stretch>
             <a:fillRect/>
           </a:stretch>
         </p:blipFill>
-        <p:spPr>
+        <p:spPr bwMode="auto">
           <a:xfrm>
-            <a:off x="271849" y="1296172"/>
-            <a:ext cx="4250724" cy="2665708"/>
+            <a:off x="4573587" y="806450"/>
+            <a:ext cx="3044825" cy="5245100"/>
           </a:xfrm>
           <a:prstGeom prst="rect">
             <a:avLst/>
           </a:prstGeom>
+          <a:noFill/>
+          <a:ln>
+            <a:noFill/>
+          </a:ln>
         </p:spPr>
       </p:pic>
-      <p:pic>
-        <p:nvPicPr>
-          <p:cNvPr id="18" name="Picture 17">
-            <a:extLst>
-              <a:ext uri="{FF2B5EF4-FFF2-40B4-BE49-F238E27FC236}">
-                <a16:creationId xmlns:a16="http://schemas.microsoft.com/office/drawing/2014/main" id="{3F885211-A38E-4D3E-81C1-FEDDA0658A59}"/>
-              </a:ext>
-            </a:extLst>
-          </p:cNvPr>
-          <p:cNvPicPr>
-            <a:picLocks noChangeAspect="1"/>
-          </p:cNvPicPr>
-          <p:nvPr/>
-        </p:nvPicPr>
-        <p:blipFill>
-          <a:blip r:embed="rId3">
-            <a:extLst>
-              <a:ext uri="{28A0092B-C50C-407E-A947-70E740481C1C}">
-                <a14:useLocalDpi xmlns:a14="http://schemas.microsoft.com/office/drawing/2010/main" val="0"/>
-              </a:ext>
-            </a:extLst>
-          </a:blip>
-          <a:stretch>
-            <a:fillRect/>
-          </a:stretch>
-        </p:blipFill>
-        <p:spPr>
-          <a:xfrm>
-            <a:off x="1216935" y="3941146"/>
-            <a:ext cx="3613681" cy="2943637"/>
-          </a:xfrm>
-          <a:prstGeom prst="rect">
-            <a:avLst/>
-          </a:prstGeom>
-        </p:spPr>
-      </p:pic>
-      <p:grpSp>
-        <p:nvGrpSpPr>
-          <p:cNvPr id="5" name="Group 4">
-            <a:extLst>
-              <a:ext uri="{FF2B5EF4-FFF2-40B4-BE49-F238E27FC236}">
-                <a16:creationId xmlns:a16="http://schemas.microsoft.com/office/drawing/2014/main" id="{BB1D3CE7-0773-40F4-8F93-DCD5BCEE418B}"/>
-              </a:ext>
-            </a:extLst>
-          </p:cNvPr>
-          <p:cNvGrpSpPr/>
-          <p:nvPr/>
-        </p:nvGrpSpPr>
-        <p:grpSpPr>
-          <a:xfrm>
-            <a:off x="7924820" y="2285213"/>
-            <a:ext cx="2676839" cy="2905530"/>
-            <a:chOff x="7669429" y="3941146"/>
-            <a:chExt cx="2676839" cy="2905530"/>
-          </a:xfrm>
-        </p:grpSpPr>
-        <p:pic>
-          <p:nvPicPr>
-            <p:cNvPr id="16" name="Picture 15" descr="Text&#10;&#10;Description automatically generated">
-              <a:extLst>
-                <a:ext uri="{FF2B5EF4-FFF2-40B4-BE49-F238E27FC236}">
-                  <a16:creationId xmlns:a16="http://schemas.microsoft.com/office/drawing/2014/main" id="{27760BB8-1B14-4885-BE8A-8B7E3A91FC9B}"/>
-                </a:ext>
-              </a:extLst>
-            </p:cNvPr>
-            <p:cNvPicPr>
-              <a:picLocks noChangeAspect="1"/>
-            </p:cNvPicPr>
-            <p:nvPr/>
-          </p:nvPicPr>
-          <p:blipFill rotWithShape="1">
-            <a:blip r:embed="rId4">
-              <a:extLst>
-                <a:ext uri="{28A0092B-C50C-407E-A947-70E740481C1C}">
-                  <a14:useLocalDpi xmlns:a14="http://schemas.microsoft.com/office/drawing/2010/main" val="0"/>
-                </a:ext>
-              </a:extLst>
-            </a:blip>
-            <a:srcRect r="19255"/>
-            <a:stretch/>
-          </p:blipFill>
-          <p:spPr>
-            <a:xfrm>
-              <a:off x="7669430" y="3941146"/>
-              <a:ext cx="2676838" cy="2905530"/>
-            </a:xfrm>
-            <a:prstGeom prst="rect">
-              <a:avLst/>
-            </a:prstGeom>
-          </p:spPr>
-        </p:pic>
-        <p:sp>
-          <p:nvSpPr>
-            <p:cNvPr id="9" name="Rectangle 8">
-              <a:extLst>
-                <a:ext uri="{FF2B5EF4-FFF2-40B4-BE49-F238E27FC236}">
-                  <a16:creationId xmlns:a16="http://schemas.microsoft.com/office/drawing/2014/main" id="{9D8B05DF-0DBD-4BDC-A5AD-C4D811A22897}"/>
-                </a:ext>
-              </a:extLst>
-            </p:cNvPr>
-            <p:cNvSpPr/>
-            <p:nvPr/>
-          </p:nvSpPr>
-          <p:spPr>
-            <a:xfrm>
-              <a:off x="7669429" y="4859867"/>
-              <a:ext cx="2202704" cy="186267"/>
-            </a:xfrm>
-            <a:prstGeom prst="rect">
-              <a:avLst/>
-            </a:prstGeom>
-            <a:solidFill>
-              <a:srgbClr val="F3F3F3"/>
-            </a:solidFill>
-            <a:ln>
-              <a:noFill/>
-            </a:ln>
-          </p:spPr>
-          <p:style>
-            <a:lnRef idx="2">
-              <a:schemeClr val="accent1">
-                <a:shade val="50000"/>
-              </a:schemeClr>
-            </a:lnRef>
-            <a:fillRef idx="1">
-              <a:schemeClr val="accent1"/>
-            </a:fillRef>
-            <a:effectRef idx="0">
-              <a:schemeClr val="accent1"/>
-            </a:effectRef>
-            <a:fontRef idx="minor">
-              <a:schemeClr val="lt1"/>
-            </a:fontRef>
-          </p:style>
-          <p:txBody>
-            <a:bodyPr rtlCol="0" anchor="ctr"/>
-            <a:lstStyle/>
-            <a:p>
-              <a:pPr algn="ctr"/>
-              <a:endParaRPr lang="en-GB"/>
-            </a:p>
-          </p:txBody>
-        </p:sp>
-        <p:sp>
-          <p:nvSpPr>
-            <p:cNvPr id="10" name="Rectangle 9">
-              <a:extLst>
-                <a:ext uri="{FF2B5EF4-FFF2-40B4-BE49-F238E27FC236}">
-                  <a16:creationId xmlns:a16="http://schemas.microsoft.com/office/drawing/2014/main" id="{B08F49AD-F79F-484E-9F0B-B67D0C391ECF}"/>
-                </a:ext>
-              </a:extLst>
-            </p:cNvPr>
-            <p:cNvSpPr/>
-            <p:nvPr/>
-          </p:nvSpPr>
-          <p:spPr>
-            <a:xfrm>
-              <a:off x="9633696" y="5412964"/>
-              <a:ext cx="712571" cy="186267"/>
-            </a:xfrm>
-            <a:prstGeom prst="rect">
-              <a:avLst/>
-            </a:prstGeom>
-            <a:solidFill>
-              <a:srgbClr val="F3F3F3"/>
-            </a:solidFill>
-            <a:ln>
-              <a:noFill/>
-            </a:ln>
-          </p:spPr>
-          <p:style>
-            <a:lnRef idx="2">
-              <a:schemeClr val="accent1">
-                <a:shade val="50000"/>
-              </a:schemeClr>
-            </a:lnRef>
-            <a:fillRef idx="1">
-              <a:schemeClr val="accent1"/>
-            </a:fillRef>
-            <a:effectRef idx="0">
-              <a:schemeClr val="accent1"/>
-            </a:effectRef>
-            <a:fontRef idx="minor">
-              <a:schemeClr val="lt1"/>
-            </a:fontRef>
-          </p:style>
-          <p:txBody>
-            <a:bodyPr rtlCol="0" anchor="ctr"/>
-            <a:lstStyle/>
-            <a:p>
-              <a:pPr algn="ctr"/>
-              <a:endParaRPr lang="en-GB"/>
-            </a:p>
-          </p:txBody>
-        </p:sp>
-      </p:grpSp>
-      <p:grpSp>
-        <p:nvGrpSpPr>
-          <p:cNvPr id="6" name="Group 5">
-            <a:extLst>
-              <a:ext uri="{FF2B5EF4-FFF2-40B4-BE49-F238E27FC236}">
-                <a16:creationId xmlns:a16="http://schemas.microsoft.com/office/drawing/2014/main" id="{CEB70FE1-0A94-4D64-8F8A-EEE62C459582}"/>
-              </a:ext>
-            </a:extLst>
-          </p:cNvPr>
-          <p:cNvGrpSpPr/>
-          <p:nvPr/>
-        </p:nvGrpSpPr>
-        <p:grpSpPr>
-          <a:xfrm>
-            <a:off x="5029451" y="2280973"/>
-            <a:ext cx="2676838" cy="2943636"/>
-            <a:chOff x="7669429" y="1027906"/>
-            <a:chExt cx="2676838" cy="2943636"/>
-          </a:xfrm>
-        </p:grpSpPr>
-        <p:pic>
-          <p:nvPicPr>
-            <p:cNvPr id="12" name="Picture 11" descr="Text&#10;&#10;Description automatically generated">
-              <a:extLst>
-                <a:ext uri="{FF2B5EF4-FFF2-40B4-BE49-F238E27FC236}">
-                  <a16:creationId xmlns:a16="http://schemas.microsoft.com/office/drawing/2014/main" id="{85C495AB-6791-430D-B6D5-CB0954CC9469}"/>
-                </a:ext>
-              </a:extLst>
-            </p:cNvPr>
-            <p:cNvPicPr>
-              <a:picLocks noChangeAspect="1"/>
-            </p:cNvPicPr>
-            <p:nvPr/>
-          </p:nvPicPr>
-          <p:blipFill rotWithShape="1">
-            <a:blip r:embed="rId5">
-              <a:extLst>
-                <a:ext uri="{28A0092B-C50C-407E-A947-70E740481C1C}">
-                  <a14:useLocalDpi xmlns:a14="http://schemas.microsoft.com/office/drawing/2010/main" val="0"/>
-                </a:ext>
-              </a:extLst>
-            </a:blip>
-            <a:srcRect r="19022"/>
-            <a:stretch/>
-          </p:blipFill>
-          <p:spPr>
-            <a:xfrm>
-              <a:off x="7669429" y="1027906"/>
-              <a:ext cx="2676838" cy="2943636"/>
-            </a:xfrm>
-            <a:prstGeom prst="rect">
-              <a:avLst/>
-            </a:prstGeom>
-          </p:spPr>
-        </p:pic>
-        <p:sp>
-          <p:nvSpPr>
-            <p:cNvPr id="3" name="Rectangle 2">
-              <a:extLst>
-                <a:ext uri="{FF2B5EF4-FFF2-40B4-BE49-F238E27FC236}">
-                  <a16:creationId xmlns:a16="http://schemas.microsoft.com/office/drawing/2014/main" id="{DB58024D-58EA-49CC-8258-8938DA236C68}"/>
-                </a:ext>
-              </a:extLst>
-            </p:cNvPr>
-            <p:cNvSpPr/>
-            <p:nvPr/>
-          </p:nvSpPr>
-          <p:spPr>
-            <a:xfrm>
-              <a:off x="7669429" y="1930400"/>
-              <a:ext cx="2202704" cy="186267"/>
-            </a:xfrm>
-            <a:prstGeom prst="rect">
-              <a:avLst/>
-            </a:prstGeom>
-            <a:solidFill>
-              <a:srgbClr val="F3F3F3"/>
-            </a:solidFill>
-            <a:ln>
-              <a:noFill/>
-            </a:ln>
-          </p:spPr>
-          <p:style>
-            <a:lnRef idx="2">
-              <a:schemeClr val="accent1">
-                <a:shade val="50000"/>
-              </a:schemeClr>
-            </a:lnRef>
-            <a:fillRef idx="1">
-              <a:schemeClr val="accent1"/>
-            </a:fillRef>
-            <a:effectRef idx="0">
-              <a:schemeClr val="accent1"/>
-            </a:effectRef>
-            <a:fontRef idx="minor">
-              <a:schemeClr val="lt1"/>
-            </a:fontRef>
-          </p:style>
-          <p:txBody>
-            <a:bodyPr rtlCol="0" anchor="ctr"/>
-            <a:lstStyle/>
-            <a:p>
-              <a:pPr algn="ctr"/>
-              <a:endParaRPr lang="en-GB"/>
-            </a:p>
-          </p:txBody>
-        </p:sp>
-        <p:sp>
-          <p:nvSpPr>
-            <p:cNvPr id="11" name="Rectangle 10">
-              <a:extLst>
-                <a:ext uri="{FF2B5EF4-FFF2-40B4-BE49-F238E27FC236}">
-                  <a16:creationId xmlns:a16="http://schemas.microsoft.com/office/drawing/2014/main" id="{1DA87BF2-B576-4761-82AC-1003CB30929D}"/>
-                </a:ext>
-              </a:extLst>
-            </p:cNvPr>
-            <p:cNvSpPr/>
-            <p:nvPr/>
-          </p:nvSpPr>
-          <p:spPr>
-            <a:xfrm>
-              <a:off x="9717447" y="2507434"/>
-              <a:ext cx="628820" cy="186267"/>
-            </a:xfrm>
-            <a:prstGeom prst="rect">
-              <a:avLst/>
-            </a:prstGeom>
-            <a:solidFill>
-              <a:srgbClr val="F3F3F3"/>
-            </a:solidFill>
-            <a:ln>
-              <a:noFill/>
-            </a:ln>
-          </p:spPr>
-          <p:style>
-            <a:lnRef idx="2">
-              <a:schemeClr val="accent1">
-                <a:shade val="50000"/>
-              </a:schemeClr>
-            </a:lnRef>
-            <a:fillRef idx="1">
-              <a:schemeClr val="accent1"/>
-            </a:fillRef>
-            <a:effectRef idx="0">
-              <a:schemeClr val="accent1"/>
-            </a:effectRef>
-            <a:fontRef idx="minor">
-              <a:schemeClr val="lt1"/>
-            </a:fontRef>
-          </p:style>
-          <p:txBody>
-            <a:bodyPr rtlCol="0" anchor="ctr"/>
-            <a:lstStyle/>
-            <a:p>
-              <a:pPr algn="ctr"/>
-              <a:endParaRPr lang="en-GB"/>
-            </a:p>
-          </p:txBody>
-        </p:sp>
-      </p:grpSp>
     </p:spTree>
     <p:extLst>
       <p:ext uri="{BB962C8B-B14F-4D97-AF65-F5344CB8AC3E}">
-        <p14:creationId xmlns:p14="http://schemas.microsoft.com/office/powerpoint/2010/main" val="2475213934"/>
+        <p14:creationId xmlns:p14="http://schemas.microsoft.com/office/powerpoint/2010/main" val="2748871370"/>
       </p:ext>
     </p:extLst>
   </p:cSld>
@@ -4055,6 +3918,486 @@
           <p:cNvPr id="2" name="Title 1">
             <a:extLst>
               <a:ext uri="{FF2B5EF4-FFF2-40B4-BE49-F238E27FC236}">
+                <a16:creationId xmlns:a16="http://schemas.microsoft.com/office/drawing/2014/main" id="{9ECB5ABF-A678-4857-96BA-42960580D530}"/>
+              </a:ext>
+            </a:extLst>
+          </p:cNvPr>
+          <p:cNvSpPr>
+            <a:spLocks noGrp="1"/>
+          </p:cNvSpPr>
+          <p:nvPr>
+            <p:ph type="title"/>
+          </p:nvPr>
+        </p:nvSpPr>
+        <p:spPr/>
+        <p:txBody>
+          <a:bodyPr/>
+          <a:lstStyle/>
+          <a:p>
+            <a:r>
+              <a:rPr lang="fi-FI" dirty="0" err="1"/>
+              <a:t>Implicit</a:t>
+            </a:r>
+            <a:r>
+              <a:rPr lang="fi-FI" dirty="0"/>
+              <a:t> Feature </a:t>
+            </a:r>
+            <a:r>
+              <a:rPr lang="fi-FI" dirty="0" err="1"/>
+              <a:t>Importance</a:t>
+            </a:r>
+            <a:endParaRPr lang="en-GB" dirty="0"/>
+          </a:p>
+        </p:txBody>
+      </p:sp>
+      <p:pic>
+        <p:nvPicPr>
+          <p:cNvPr id="8" name="Picture 7" descr="Chart, bar chart, funnel chart&#10;&#10;Description automatically generated">
+            <a:extLst>
+              <a:ext uri="{FF2B5EF4-FFF2-40B4-BE49-F238E27FC236}">
+                <a16:creationId xmlns:a16="http://schemas.microsoft.com/office/drawing/2014/main" id="{9B78ED4A-3E91-4051-8549-88A275D51710}"/>
+              </a:ext>
+            </a:extLst>
+          </p:cNvPr>
+          <p:cNvPicPr>
+            <a:picLocks noChangeAspect="1"/>
+          </p:cNvPicPr>
+          <p:nvPr/>
+        </p:nvPicPr>
+        <p:blipFill>
+          <a:blip r:embed="rId2">
+            <a:extLst>
+              <a:ext uri="{28A0092B-C50C-407E-A947-70E740481C1C}">
+                <a14:useLocalDpi xmlns:a14="http://schemas.microsoft.com/office/drawing/2010/main" val="0"/>
+              </a:ext>
+            </a:extLst>
+          </a:blip>
+          <a:stretch>
+            <a:fillRect/>
+          </a:stretch>
+        </p:blipFill>
+        <p:spPr>
+          <a:xfrm>
+            <a:off x="271849" y="1296172"/>
+            <a:ext cx="4250724" cy="2665708"/>
+          </a:xfrm>
+          <a:prstGeom prst="rect">
+            <a:avLst/>
+          </a:prstGeom>
+        </p:spPr>
+      </p:pic>
+      <p:pic>
+        <p:nvPicPr>
+          <p:cNvPr id="18" name="Picture 17">
+            <a:extLst>
+              <a:ext uri="{FF2B5EF4-FFF2-40B4-BE49-F238E27FC236}">
+                <a16:creationId xmlns:a16="http://schemas.microsoft.com/office/drawing/2014/main" id="{3F885211-A38E-4D3E-81C1-FEDDA0658A59}"/>
+              </a:ext>
+            </a:extLst>
+          </p:cNvPr>
+          <p:cNvPicPr>
+            <a:picLocks noChangeAspect="1"/>
+          </p:cNvPicPr>
+          <p:nvPr/>
+        </p:nvPicPr>
+        <p:blipFill>
+          <a:blip r:embed="rId3">
+            <a:extLst>
+              <a:ext uri="{28A0092B-C50C-407E-A947-70E740481C1C}">
+                <a14:useLocalDpi xmlns:a14="http://schemas.microsoft.com/office/drawing/2010/main" val="0"/>
+              </a:ext>
+            </a:extLst>
+          </a:blip>
+          <a:stretch>
+            <a:fillRect/>
+          </a:stretch>
+        </p:blipFill>
+        <p:spPr>
+          <a:xfrm>
+            <a:off x="1216935" y="3941146"/>
+            <a:ext cx="3613681" cy="2943637"/>
+          </a:xfrm>
+          <a:prstGeom prst="rect">
+            <a:avLst/>
+          </a:prstGeom>
+        </p:spPr>
+      </p:pic>
+      <p:grpSp>
+        <p:nvGrpSpPr>
+          <p:cNvPr id="4" name="Group 3">
+            <a:extLst>
+              <a:ext uri="{FF2B5EF4-FFF2-40B4-BE49-F238E27FC236}">
+                <a16:creationId xmlns:a16="http://schemas.microsoft.com/office/drawing/2014/main" id="{60D519C3-C41E-4E23-9C6E-39D85EC076FB}"/>
+              </a:ext>
+            </a:extLst>
+          </p:cNvPr>
+          <p:cNvGrpSpPr/>
+          <p:nvPr/>
+        </p:nvGrpSpPr>
+        <p:grpSpPr>
+          <a:xfrm>
+            <a:off x="5029451" y="2280973"/>
+            <a:ext cx="5572208" cy="2943636"/>
+            <a:chOff x="5029451" y="2280973"/>
+            <a:chExt cx="5572208" cy="2943636"/>
+          </a:xfrm>
+        </p:grpSpPr>
+        <p:grpSp>
+          <p:nvGrpSpPr>
+            <p:cNvPr id="5" name="Group 4">
+              <a:extLst>
+                <a:ext uri="{FF2B5EF4-FFF2-40B4-BE49-F238E27FC236}">
+                  <a16:creationId xmlns:a16="http://schemas.microsoft.com/office/drawing/2014/main" id="{BB1D3CE7-0773-40F4-8F93-DCD5BCEE418B}"/>
+                </a:ext>
+              </a:extLst>
+            </p:cNvPr>
+            <p:cNvGrpSpPr/>
+            <p:nvPr/>
+          </p:nvGrpSpPr>
+          <p:grpSpPr>
+            <a:xfrm>
+              <a:off x="7924820" y="2285213"/>
+              <a:ext cx="2676839" cy="2905530"/>
+              <a:chOff x="7669429" y="3941146"/>
+              <a:chExt cx="2676839" cy="2905530"/>
+            </a:xfrm>
+          </p:grpSpPr>
+          <p:pic>
+            <p:nvPicPr>
+              <p:cNvPr id="16" name="Picture 15" descr="Text&#10;&#10;Description automatically generated">
+                <a:extLst>
+                  <a:ext uri="{FF2B5EF4-FFF2-40B4-BE49-F238E27FC236}">
+                    <a16:creationId xmlns:a16="http://schemas.microsoft.com/office/drawing/2014/main" id="{27760BB8-1B14-4885-BE8A-8B7E3A91FC9B}"/>
+                  </a:ext>
+                </a:extLst>
+              </p:cNvPr>
+              <p:cNvPicPr>
+                <a:picLocks noChangeAspect="1"/>
+              </p:cNvPicPr>
+              <p:nvPr/>
+            </p:nvPicPr>
+            <p:blipFill rotWithShape="1">
+              <a:blip r:embed="rId4">
+                <a:extLst>
+                  <a:ext uri="{28A0092B-C50C-407E-A947-70E740481C1C}">
+                    <a14:useLocalDpi xmlns:a14="http://schemas.microsoft.com/office/drawing/2010/main" val="0"/>
+                  </a:ext>
+                </a:extLst>
+              </a:blip>
+              <a:srcRect r="19255"/>
+              <a:stretch/>
+            </p:blipFill>
+            <p:spPr>
+              <a:xfrm>
+                <a:off x="7669430" y="3941146"/>
+                <a:ext cx="2676838" cy="2905530"/>
+              </a:xfrm>
+              <a:prstGeom prst="rect">
+                <a:avLst/>
+              </a:prstGeom>
+            </p:spPr>
+          </p:pic>
+          <p:sp>
+            <p:nvSpPr>
+              <p:cNvPr id="9" name="Rectangle 8">
+                <a:extLst>
+                  <a:ext uri="{FF2B5EF4-FFF2-40B4-BE49-F238E27FC236}">
+                    <a16:creationId xmlns:a16="http://schemas.microsoft.com/office/drawing/2014/main" id="{9D8B05DF-0DBD-4BDC-A5AD-C4D811A22897}"/>
+                  </a:ext>
+                </a:extLst>
+              </p:cNvPr>
+              <p:cNvSpPr/>
+              <p:nvPr/>
+            </p:nvSpPr>
+            <p:spPr>
+              <a:xfrm>
+                <a:off x="7669429" y="4859867"/>
+                <a:ext cx="2202704" cy="186267"/>
+              </a:xfrm>
+              <a:prstGeom prst="rect">
+                <a:avLst/>
+              </a:prstGeom>
+              <a:solidFill>
+                <a:srgbClr val="F3F3F3"/>
+              </a:solidFill>
+              <a:ln>
+                <a:noFill/>
+              </a:ln>
+            </p:spPr>
+            <p:style>
+              <a:lnRef idx="2">
+                <a:schemeClr val="accent1">
+                  <a:shade val="50000"/>
+                </a:schemeClr>
+              </a:lnRef>
+              <a:fillRef idx="1">
+                <a:schemeClr val="accent1"/>
+              </a:fillRef>
+              <a:effectRef idx="0">
+                <a:schemeClr val="accent1"/>
+              </a:effectRef>
+              <a:fontRef idx="minor">
+                <a:schemeClr val="lt1"/>
+              </a:fontRef>
+            </p:style>
+            <p:txBody>
+              <a:bodyPr rtlCol="0" anchor="ctr"/>
+              <a:lstStyle/>
+              <a:p>
+                <a:pPr algn="ctr"/>
+                <a:endParaRPr lang="en-GB"/>
+              </a:p>
+            </p:txBody>
+          </p:sp>
+          <p:sp>
+            <p:nvSpPr>
+              <p:cNvPr id="10" name="Rectangle 9">
+                <a:extLst>
+                  <a:ext uri="{FF2B5EF4-FFF2-40B4-BE49-F238E27FC236}">
+                    <a16:creationId xmlns:a16="http://schemas.microsoft.com/office/drawing/2014/main" id="{B08F49AD-F79F-484E-9F0B-B67D0C391ECF}"/>
+                  </a:ext>
+                </a:extLst>
+              </p:cNvPr>
+              <p:cNvSpPr/>
+              <p:nvPr/>
+            </p:nvSpPr>
+            <p:spPr>
+              <a:xfrm>
+                <a:off x="9633696" y="5412964"/>
+                <a:ext cx="712571" cy="186267"/>
+              </a:xfrm>
+              <a:prstGeom prst="rect">
+                <a:avLst/>
+              </a:prstGeom>
+              <a:solidFill>
+                <a:srgbClr val="F3F3F3"/>
+              </a:solidFill>
+              <a:ln>
+                <a:noFill/>
+              </a:ln>
+            </p:spPr>
+            <p:style>
+              <a:lnRef idx="2">
+                <a:schemeClr val="accent1">
+                  <a:shade val="50000"/>
+                </a:schemeClr>
+              </a:lnRef>
+              <a:fillRef idx="1">
+                <a:schemeClr val="accent1"/>
+              </a:fillRef>
+              <a:effectRef idx="0">
+                <a:schemeClr val="accent1"/>
+              </a:effectRef>
+              <a:fontRef idx="minor">
+                <a:schemeClr val="lt1"/>
+              </a:fontRef>
+            </p:style>
+            <p:txBody>
+              <a:bodyPr rtlCol="0" anchor="ctr"/>
+              <a:lstStyle/>
+              <a:p>
+                <a:pPr algn="ctr"/>
+                <a:endParaRPr lang="en-GB"/>
+              </a:p>
+            </p:txBody>
+          </p:sp>
+        </p:grpSp>
+        <p:grpSp>
+          <p:nvGrpSpPr>
+            <p:cNvPr id="6" name="Group 5">
+              <a:extLst>
+                <a:ext uri="{FF2B5EF4-FFF2-40B4-BE49-F238E27FC236}">
+                  <a16:creationId xmlns:a16="http://schemas.microsoft.com/office/drawing/2014/main" id="{CEB70FE1-0A94-4D64-8F8A-EEE62C459582}"/>
+                </a:ext>
+              </a:extLst>
+            </p:cNvPr>
+            <p:cNvGrpSpPr/>
+            <p:nvPr/>
+          </p:nvGrpSpPr>
+          <p:grpSpPr>
+            <a:xfrm>
+              <a:off x="5029451" y="2280973"/>
+              <a:ext cx="2676838" cy="2943636"/>
+              <a:chOff x="7669429" y="1027906"/>
+              <a:chExt cx="2676838" cy="2943636"/>
+            </a:xfrm>
+          </p:grpSpPr>
+          <p:pic>
+            <p:nvPicPr>
+              <p:cNvPr id="12" name="Picture 11" descr="Text&#10;&#10;Description automatically generated">
+                <a:extLst>
+                  <a:ext uri="{FF2B5EF4-FFF2-40B4-BE49-F238E27FC236}">
+                    <a16:creationId xmlns:a16="http://schemas.microsoft.com/office/drawing/2014/main" id="{85C495AB-6791-430D-B6D5-CB0954CC9469}"/>
+                  </a:ext>
+                </a:extLst>
+              </p:cNvPr>
+              <p:cNvPicPr>
+                <a:picLocks noChangeAspect="1"/>
+              </p:cNvPicPr>
+              <p:nvPr/>
+            </p:nvPicPr>
+            <p:blipFill rotWithShape="1">
+              <a:blip r:embed="rId5">
+                <a:extLst>
+                  <a:ext uri="{28A0092B-C50C-407E-A947-70E740481C1C}">
+                    <a14:useLocalDpi xmlns:a14="http://schemas.microsoft.com/office/drawing/2010/main" val="0"/>
+                  </a:ext>
+                </a:extLst>
+              </a:blip>
+              <a:srcRect r="19022"/>
+              <a:stretch/>
+            </p:blipFill>
+            <p:spPr>
+              <a:xfrm>
+                <a:off x="7669429" y="1027906"/>
+                <a:ext cx="2676838" cy="2943636"/>
+              </a:xfrm>
+              <a:prstGeom prst="rect">
+                <a:avLst/>
+              </a:prstGeom>
+            </p:spPr>
+          </p:pic>
+          <p:sp>
+            <p:nvSpPr>
+              <p:cNvPr id="3" name="Rectangle 2">
+                <a:extLst>
+                  <a:ext uri="{FF2B5EF4-FFF2-40B4-BE49-F238E27FC236}">
+                    <a16:creationId xmlns:a16="http://schemas.microsoft.com/office/drawing/2014/main" id="{DB58024D-58EA-49CC-8258-8938DA236C68}"/>
+                  </a:ext>
+                </a:extLst>
+              </p:cNvPr>
+              <p:cNvSpPr/>
+              <p:nvPr/>
+            </p:nvSpPr>
+            <p:spPr>
+              <a:xfrm>
+                <a:off x="7669429" y="1930400"/>
+                <a:ext cx="2202704" cy="186267"/>
+              </a:xfrm>
+              <a:prstGeom prst="rect">
+                <a:avLst/>
+              </a:prstGeom>
+              <a:solidFill>
+                <a:srgbClr val="F3F3F3"/>
+              </a:solidFill>
+              <a:ln>
+                <a:noFill/>
+              </a:ln>
+            </p:spPr>
+            <p:style>
+              <a:lnRef idx="2">
+                <a:schemeClr val="accent1">
+                  <a:shade val="50000"/>
+                </a:schemeClr>
+              </a:lnRef>
+              <a:fillRef idx="1">
+                <a:schemeClr val="accent1"/>
+              </a:fillRef>
+              <a:effectRef idx="0">
+                <a:schemeClr val="accent1"/>
+              </a:effectRef>
+              <a:fontRef idx="minor">
+                <a:schemeClr val="lt1"/>
+              </a:fontRef>
+            </p:style>
+            <p:txBody>
+              <a:bodyPr rtlCol="0" anchor="ctr"/>
+              <a:lstStyle/>
+              <a:p>
+                <a:pPr algn="ctr"/>
+                <a:endParaRPr lang="en-GB"/>
+              </a:p>
+            </p:txBody>
+          </p:sp>
+          <p:sp>
+            <p:nvSpPr>
+              <p:cNvPr id="11" name="Rectangle 10">
+                <a:extLst>
+                  <a:ext uri="{FF2B5EF4-FFF2-40B4-BE49-F238E27FC236}">
+                    <a16:creationId xmlns:a16="http://schemas.microsoft.com/office/drawing/2014/main" id="{1DA87BF2-B576-4761-82AC-1003CB30929D}"/>
+                  </a:ext>
+                </a:extLst>
+              </p:cNvPr>
+              <p:cNvSpPr/>
+              <p:nvPr/>
+            </p:nvSpPr>
+            <p:spPr>
+              <a:xfrm>
+                <a:off x="9717447" y="2507434"/>
+                <a:ext cx="628820" cy="186267"/>
+              </a:xfrm>
+              <a:prstGeom prst="rect">
+                <a:avLst/>
+              </a:prstGeom>
+              <a:solidFill>
+                <a:srgbClr val="F3F3F3"/>
+              </a:solidFill>
+              <a:ln>
+                <a:noFill/>
+              </a:ln>
+            </p:spPr>
+            <p:style>
+              <a:lnRef idx="2">
+                <a:schemeClr val="accent1">
+                  <a:shade val="50000"/>
+                </a:schemeClr>
+              </a:lnRef>
+              <a:fillRef idx="1">
+                <a:schemeClr val="accent1"/>
+              </a:fillRef>
+              <a:effectRef idx="0">
+                <a:schemeClr val="accent1"/>
+              </a:effectRef>
+              <a:fontRef idx="minor">
+                <a:schemeClr val="lt1"/>
+              </a:fontRef>
+            </p:style>
+            <p:txBody>
+              <a:bodyPr rtlCol="0" anchor="ctr"/>
+              <a:lstStyle/>
+              <a:p>
+                <a:pPr algn="ctr"/>
+                <a:endParaRPr lang="en-GB"/>
+              </a:p>
+            </p:txBody>
+          </p:sp>
+        </p:grpSp>
+      </p:grpSp>
+    </p:spTree>
+    <p:extLst>
+      <p:ext uri="{BB962C8B-B14F-4D97-AF65-F5344CB8AC3E}">
+        <p14:creationId xmlns:p14="http://schemas.microsoft.com/office/powerpoint/2010/main" val="2475213934"/>
+      </p:ext>
+    </p:extLst>
+  </p:cSld>
+  <p:clrMapOvr>
+    <a:masterClrMapping/>
+  </p:clrMapOvr>
+</p:sld>
+</file>
+
+<file path=ppt/slides/slide4.xml><?xml version="1.0" encoding="utf-8"?>
+<p:sld xmlns:a="http://schemas.openxmlformats.org/drawingml/2006/main" xmlns:r="http://schemas.openxmlformats.org/officeDocument/2006/relationships" xmlns:p="http://schemas.openxmlformats.org/presentationml/2006/main">
+  <p:cSld>
+    <p:spTree>
+      <p:nvGrpSpPr>
+        <p:cNvPr id="1" name=""/>
+        <p:cNvGrpSpPr/>
+        <p:nvPr/>
+      </p:nvGrpSpPr>
+      <p:grpSpPr>
+        <a:xfrm>
+          <a:off x="0" y="0"/>
+          <a:ext cx="0" cy="0"/>
+          <a:chOff x="0" y="0"/>
+          <a:chExt cx="0" cy="0"/>
+        </a:xfrm>
+      </p:grpSpPr>
+      <p:sp>
+        <p:nvSpPr>
+          <p:cNvPr id="2" name="Title 1">
+            <a:extLst>
+              <a:ext uri="{FF2B5EF4-FFF2-40B4-BE49-F238E27FC236}">
                 <a16:creationId xmlns:a16="http://schemas.microsoft.com/office/drawing/2014/main" id="{B570B927-0677-4347-9569-003EDE21C8B0}"/>
               </a:ext>
             </a:extLst>
@@ -4246,7 +4589,7 @@
 </p:sld>
 </file>
 
-<file path=ppt/slides/slide4.xml><?xml version="1.0" encoding="utf-8"?>
+<file path=ppt/slides/slide5.xml><?xml version="1.0" encoding="utf-8"?>
 <p:sld xmlns:a="http://schemas.openxmlformats.org/drawingml/2006/main" xmlns:r="http://schemas.openxmlformats.org/officeDocument/2006/relationships" xmlns:p="http://schemas.openxmlformats.org/presentationml/2006/main">
   <p:cSld>
     <p:spTree>
@@ -4484,7 +4827,7 @@
 </p:sld>
 </file>
 
-<file path=ppt/slides/slide5.xml><?xml version="1.0" encoding="utf-8"?>
+<file path=ppt/slides/slide6.xml><?xml version="1.0" encoding="utf-8"?>
 <p:sld xmlns:a="http://schemas.openxmlformats.org/drawingml/2006/main" xmlns:r="http://schemas.openxmlformats.org/officeDocument/2006/relationships" xmlns:p="http://schemas.openxmlformats.org/presentationml/2006/main">
   <p:cSld>
     <p:spTree>
@@ -4731,7 +5074,7 @@
 </p:sld>
 </file>
 
-<file path=ppt/slides/slide6.xml><?xml version="1.0" encoding="utf-8"?>
+<file path=ppt/slides/slide7.xml><?xml version="1.0" encoding="utf-8"?>
 <p:sld xmlns:a="http://schemas.openxmlformats.org/drawingml/2006/main" xmlns:r="http://schemas.openxmlformats.org/officeDocument/2006/relationships" xmlns:p="http://schemas.openxmlformats.org/presentationml/2006/main">
   <p:cSld>
     <p:spTree>
@@ -4953,219 +5296,6 @@
     <p:extLst>
       <p:ext uri="{BB962C8B-B14F-4D97-AF65-F5344CB8AC3E}">
         <p14:creationId xmlns:p14="http://schemas.microsoft.com/office/powerpoint/2010/main" val="1373800863"/>
-      </p:ext>
-    </p:extLst>
-  </p:cSld>
-  <p:clrMapOvr>
-    <a:masterClrMapping/>
-  </p:clrMapOvr>
-</p:sld>
-</file>
-
-<file path=ppt/slides/slide7.xml><?xml version="1.0" encoding="utf-8"?>
-<p:sld xmlns:a="http://schemas.openxmlformats.org/drawingml/2006/main" xmlns:r="http://schemas.openxmlformats.org/officeDocument/2006/relationships" xmlns:p="http://schemas.openxmlformats.org/presentationml/2006/main">
-  <p:cSld>
-    <p:bg>
-      <p:bgPr>
-        <a:solidFill>
-          <a:schemeClr val="bg1"/>
-        </a:solidFill>
-        <a:effectLst/>
-      </p:bgPr>
-    </p:bg>
-    <p:spTree>
-      <p:nvGrpSpPr>
-        <p:cNvPr id="1" name=""/>
-        <p:cNvGrpSpPr/>
-        <p:nvPr/>
-      </p:nvGrpSpPr>
-      <p:grpSpPr>
-        <a:xfrm>
-          <a:off x="0" y="0"/>
-          <a:ext cx="0" cy="0"/>
-          <a:chOff x="0" y="0"/>
-          <a:chExt cx="0" cy="0"/>
-        </a:xfrm>
-      </p:grpSpPr>
-      <p:sp useBgFill="1">
-        <p:nvSpPr>
-          <p:cNvPr id="12" name="Rectangle 11">
-            <a:extLst>
-              <a:ext uri="{FF2B5EF4-FFF2-40B4-BE49-F238E27FC236}">
-                <a16:creationId xmlns:a16="http://schemas.microsoft.com/office/drawing/2014/main" id="{022BDE4A-8A20-4A69-9C5A-581C82036A4D}"/>
-              </a:ext>
-              <a:ext uri="{C183D7F6-B498-43B3-948B-1728B52AA6E4}">
-                <adec:decorative xmlns:adec="http://schemas.microsoft.com/office/drawing/2017/decorative" val="1"/>
-              </a:ext>
-            </a:extLst>
-          </p:cNvPr>
-          <p:cNvSpPr>
-            <a:spLocks noGrp="1" noRot="1" noChangeAspect="1" noMove="1" noResize="1" noEditPoints="1" noAdjustHandles="1" noChangeArrowheads="1" noChangeShapeType="1" noTextEdit="1"/>
-          </p:cNvSpPr>
-          <p:nvPr>
-            <p:extLst>
-              <p:ext uri="{386F3935-93C4-4BCD-93E2-E3B085C9AB24}">
-                <p16:designElem xmlns:p16="http://schemas.microsoft.com/office/powerpoint/2015/main" val="1"/>
-              </p:ext>
-            </p:extLst>
-          </p:nvPr>
-        </p:nvSpPr>
-        <p:spPr>
-          <a:xfrm>
-            <a:off x="-1" y="0"/>
-            <a:ext cx="12188952" cy="6858000"/>
-          </a:xfrm>
-          <a:prstGeom prst="rect">
-            <a:avLst/>
-          </a:prstGeom>
-          <a:ln>
-            <a:noFill/>
-          </a:ln>
-        </p:spPr>
-        <p:style>
-          <a:lnRef idx="2">
-            <a:schemeClr val="accent1">
-              <a:shade val="50000"/>
-            </a:schemeClr>
-          </a:lnRef>
-          <a:fillRef idx="1">
-            <a:schemeClr val="accent1"/>
-          </a:fillRef>
-          <a:effectRef idx="0">
-            <a:schemeClr val="accent1"/>
-          </a:effectRef>
-          <a:fontRef idx="minor">
-            <a:schemeClr val="lt1"/>
-          </a:fontRef>
-        </p:style>
-        <p:txBody>
-          <a:bodyPr rtlCol="0" anchor="ctr"/>
-          <a:lstStyle/>
-          <a:p>
-            <a:pPr algn="ctr"/>
-            <a:endParaRPr lang="en-US"/>
-          </a:p>
-        </p:txBody>
-      </p:sp>
-      <p:sp>
-        <p:nvSpPr>
-          <p:cNvPr id="2" name="Title 1">
-            <a:extLst>
-              <a:ext uri="{FF2B5EF4-FFF2-40B4-BE49-F238E27FC236}">
-                <a16:creationId xmlns:a16="http://schemas.microsoft.com/office/drawing/2014/main" id="{2393D49A-9C3F-4232-B40B-B90C71A0B4F0}"/>
-              </a:ext>
-            </a:extLst>
-          </p:cNvPr>
-          <p:cNvSpPr>
-            <a:spLocks noGrp="1"/>
-          </p:cNvSpPr>
-          <p:nvPr>
-            <p:ph type="title"/>
-          </p:nvPr>
-        </p:nvSpPr>
-        <p:spPr>
-          <a:xfrm>
-            <a:off x="1001684" y="170412"/>
-            <a:ext cx="10178934" cy="1328730"/>
-          </a:xfrm>
-        </p:spPr>
-        <p:txBody>
-          <a:bodyPr vert="horz" lIns="91440" tIns="45720" rIns="91440" bIns="45720" rtlCol="0" anchor="b">
-            <a:normAutofit/>
-          </a:bodyPr>
-          <a:lstStyle/>
-          <a:p>
-            <a:pPr algn="ctr"/>
-            <a:r>
-              <a:rPr lang="en-US" sz="5200" kern="1200" dirty="0">
-                <a:solidFill>
-                  <a:schemeClr val="tx1"/>
-                </a:solidFill>
-                <a:latin typeface="+mj-lt"/>
-                <a:ea typeface="+mj-ea"/>
-                <a:cs typeface="+mj-cs"/>
-              </a:rPr>
-              <a:t>PDP 2D (Time-ejection)</a:t>
-            </a:r>
-          </a:p>
-        </p:txBody>
-      </p:sp>
-      <p:pic>
-        <p:nvPicPr>
-          <p:cNvPr id="5" name="Content Placeholder 4">
-            <a:extLst>
-              <a:ext uri="{FF2B5EF4-FFF2-40B4-BE49-F238E27FC236}">
-                <a16:creationId xmlns:a16="http://schemas.microsoft.com/office/drawing/2014/main" id="{7DF49395-6E99-4266-B8F5-2E09778B4D47}"/>
-              </a:ext>
-            </a:extLst>
-          </p:cNvPr>
-          <p:cNvPicPr>
-            <a:picLocks noGrp="1" noChangeAspect="1"/>
-          </p:cNvPicPr>
-          <p:nvPr>
-            <p:ph idx="1"/>
-          </p:nvPr>
-        </p:nvPicPr>
-        <p:blipFill rotWithShape="1">
-          <a:blip r:embed="rId2">
-            <a:extLst>
-              <a:ext uri="{28A0092B-C50C-407E-A947-70E740481C1C}">
-                <a14:useLocalDpi xmlns:a14="http://schemas.microsoft.com/office/drawing/2010/main" val="0"/>
-              </a:ext>
-            </a:extLst>
-          </a:blip>
-          <a:srcRect l="8259" r="-3" b="-3"/>
-          <a:stretch/>
-        </p:blipFill>
-        <p:spPr>
-          <a:xfrm>
-            <a:off x="292677" y="2410448"/>
-            <a:ext cx="5803323" cy="3890357"/>
-          </a:xfrm>
-          <a:prstGeom prst="rect">
-            <a:avLst/>
-          </a:prstGeom>
-        </p:spPr>
-      </p:pic>
-      <p:pic>
-        <p:nvPicPr>
-          <p:cNvPr id="7" name="Picture 6">
-            <a:extLst>
-              <a:ext uri="{FF2B5EF4-FFF2-40B4-BE49-F238E27FC236}">
-                <a16:creationId xmlns:a16="http://schemas.microsoft.com/office/drawing/2014/main" id="{C79BE151-4064-4191-855E-58EA46DF7964}"/>
-              </a:ext>
-            </a:extLst>
-          </p:cNvPr>
-          <p:cNvPicPr>
-            <a:picLocks noChangeAspect="1"/>
-          </p:cNvPicPr>
-          <p:nvPr/>
-        </p:nvPicPr>
-        <p:blipFill>
-          <a:blip r:embed="rId3">
-            <a:extLst>
-              <a:ext uri="{28A0092B-C50C-407E-A947-70E740481C1C}">
-                <a14:useLocalDpi xmlns:a14="http://schemas.microsoft.com/office/drawing/2010/main" val="0"/>
-              </a:ext>
-            </a:extLst>
-          </a:blip>
-          <a:srcRect/>
-          <a:stretch/>
-        </p:blipFill>
-        <p:spPr>
-          <a:xfrm>
-            <a:off x="7276797" y="2410448"/>
-            <a:ext cx="3629597" cy="3890357"/>
-          </a:xfrm>
-          <a:prstGeom prst="rect">
-            <a:avLst/>
-          </a:prstGeom>
-        </p:spPr>
-      </p:pic>
-    </p:spTree>
-    <p:extLst>
-      <p:ext uri="{BB962C8B-B14F-4D97-AF65-F5344CB8AC3E}">
-        <p14:creationId xmlns:p14="http://schemas.microsoft.com/office/powerpoint/2010/main" val="2913706745"/>
       </p:ext>
     </p:extLst>
   </p:cSld>
@@ -5298,7 +5428,7 @@
                 <a:ea typeface="+mj-ea"/>
                 <a:cs typeface="+mj-cs"/>
               </a:rPr>
-              <a:t>PDP 2D (Time-serum)</a:t>
+              <a:t>PDP 2D (Time-ejection)</a:t>
             </a:r>
           </a:p>
         </p:txBody>
@@ -5319,7 +5449,7 @@
             <p:ph idx="1"/>
           </p:nvPr>
         </p:nvPicPr>
-        <p:blipFill>
+        <p:blipFill rotWithShape="1">
           <a:blip r:embed="rId2">
             <a:extLst>
               <a:ext uri="{28A0092B-C50C-407E-A947-70E740481C1C}">
@@ -5327,13 +5457,13 @@
               </a:ext>
             </a:extLst>
           </a:blip>
-          <a:srcRect/>
+          <a:srcRect l="8259" r="-3" b="-3"/>
           <a:stretch/>
         </p:blipFill>
         <p:spPr>
           <a:xfrm>
-            <a:off x="292677" y="2590429"/>
-            <a:ext cx="5803323" cy="3530394"/>
+            <a:off x="292677" y="2410448"/>
+            <a:ext cx="5803323" cy="3890357"/>
           </a:xfrm>
           <a:prstGeom prst="rect">
             <a:avLst/>
@@ -5367,8 +5497,8 @@
         </p:blipFill>
         <p:spPr>
           <a:xfrm>
-            <a:off x="7251562" y="2410448"/>
-            <a:ext cx="3680067" cy="3890357"/>
+            <a:off x="7276797" y="2410448"/>
+            <a:ext cx="3629597" cy="3890357"/>
           </a:xfrm>
           <a:prstGeom prst="rect">
             <a:avLst/>
@@ -5378,7 +5508,7 @@
     </p:spTree>
     <p:extLst>
       <p:ext uri="{BB962C8B-B14F-4D97-AF65-F5344CB8AC3E}">
-        <p14:creationId xmlns:p14="http://schemas.microsoft.com/office/powerpoint/2010/main" val="374545288"/>
+        <p14:creationId xmlns:p14="http://schemas.microsoft.com/office/powerpoint/2010/main" val="2913706745"/>
       </p:ext>
     </p:extLst>
   </p:cSld>
@@ -5511,7 +5641,7 @@
                 <a:ea typeface="+mj-ea"/>
                 <a:cs typeface="+mj-cs"/>
               </a:rPr>
-              <a:t>PDP 2D (Ejection-serum)</a:t>
+              <a:t>PDP 2D (Time-serum)</a:t>
             </a:r>
           </a:p>
         </p:txBody>
@@ -5546,7 +5676,7 @@
         <p:spPr>
           <a:xfrm>
             <a:off x="292677" y="2590429"/>
-            <a:ext cx="5803322" cy="3530394"/>
+            <a:ext cx="5803323" cy="3530394"/>
           </a:xfrm>
           <a:prstGeom prst="rect">
             <a:avLst/>
@@ -5581,7 +5711,7 @@
         <p:spPr>
           <a:xfrm>
             <a:off x="7251562" y="2410448"/>
-            <a:ext cx="3680067" cy="3890356"/>
+            <a:ext cx="3680067" cy="3890357"/>
           </a:xfrm>
           <a:prstGeom prst="rect">
             <a:avLst/>
@@ -5591,7 +5721,7 @@
     </p:spTree>
     <p:extLst>
       <p:ext uri="{BB962C8B-B14F-4D97-AF65-F5344CB8AC3E}">
-        <p14:creationId xmlns:p14="http://schemas.microsoft.com/office/powerpoint/2010/main" val="288849488"/>
+        <p14:creationId xmlns:p14="http://schemas.microsoft.com/office/powerpoint/2010/main" val="374545288"/>
       </p:ext>
     </p:extLst>
   </p:cSld>

</xml_diff>